<commit_message>
Remove CS 5500 from titles
</commit_message>
<xml_diff>
--- a/Slides/Lesson 8.2 Deployment Infrastructure.pptx
+++ b/Slides/Lesson 8.2 Deployment Infrastructure.pptx
@@ -322,6 +322,11 @@
       </a:defRPr>
     </a:lvl9pPr>
   </p:defaultTextStyle>
+  <p:extLst>
+    <p:ext uri="{EFAFB233-063F-42B5-8137-9DF3F51BA10A}">
+      <p15:sldGuideLst xmlns:p15="http://schemas.microsoft.com/office/powerpoint/2012/main"/>
+    </p:ext>
+  </p:extLst>
 </p:presentation>
 </file>
 
@@ -3733,7 +3738,7 @@
           </a:ln>
           <a:extLst>
             <a:ext uri="{C572A759-6A51-4108-AA02-DFA0A04FC94B}">
-              <ma14:wrappingTextBoxFlag xmlns:ma14="http://schemas.microsoft.com/office/mac/drawingml/2011/main" xmlns:a14="http://schemas.microsoft.com/office/drawing/2010/main" xmlns:m="http://schemas.openxmlformats.org/officeDocument/2006/math" xmlns="" val="1"/>
+              <ma14:wrappingTextBoxFlag xmlns="" xmlns:m="http://schemas.openxmlformats.org/officeDocument/2006/math" xmlns:a14="http://schemas.microsoft.com/office/drawing/2010/main" xmlns:ma14="http://schemas.microsoft.com/office/mac/drawingml/2011/main" val="1"/>
             </a:ext>
           </a:extLst>
         </p:spPr>
@@ -3772,7 +3777,7 @@
           </a:ln>
           <a:extLst>
             <a:ext uri="{C572A759-6A51-4108-AA02-DFA0A04FC94B}">
-              <ma14:wrappingTextBoxFlag xmlns:ma14="http://schemas.microsoft.com/office/mac/drawingml/2011/main" xmlns:a14="http://schemas.microsoft.com/office/drawing/2010/main" xmlns:m="http://schemas.openxmlformats.org/officeDocument/2006/math" xmlns="" val="1"/>
+              <ma14:wrappingTextBoxFlag xmlns="" xmlns:m="http://schemas.openxmlformats.org/officeDocument/2006/math" xmlns:a14="http://schemas.microsoft.com/office/drawing/2010/main" xmlns:ma14="http://schemas.microsoft.com/office/mac/drawingml/2011/main" val="1"/>
             </a:ext>
           </a:extLst>
         </p:spPr>
@@ -4615,7 +4620,7 @@
           </a:prstGeom>
           <a:extLst>
             <a:ext uri="{C572A759-6A51-4108-AA02-DFA0A04FC94B}">
-              <ma14:wrappingTextBoxFlag xmlns:ma14="http://schemas.microsoft.com/office/mac/drawingml/2011/main" xmlns:a14="http://schemas.microsoft.com/office/drawing/2010/main" xmlns:m="http://schemas.openxmlformats.org/officeDocument/2006/math" xmlns="" val="1"/>
+              <ma14:wrappingTextBoxFlag xmlns="" xmlns:m="http://schemas.openxmlformats.org/officeDocument/2006/math" xmlns:a14="http://schemas.microsoft.com/office/drawing/2010/main" xmlns:ma14="http://schemas.microsoft.com/office/mac/drawingml/2011/main" val="1"/>
             </a:ext>
           </a:extLst>
         </p:spPr>
@@ -4718,19 +4723,8 @@
               </a:defRPr>
             </a:pPr>
             <a:r>
-              <a:t>CS 4530 &amp; CS 5500</a:t>
-            </a:r>
-          </a:p>
-          <a:p>
-            <a:pPr>
-              <a:defRPr>
-                <a:solidFill>
-                  <a:srgbClr val="005493"/>
-                </a:solidFill>
-              </a:defRPr>
-            </a:pPr>
-            <a:r>
-              <a:t>Software Engineering</a:t>
+              <a:rPr dirty="0"/>
+              <a:t>CS 4530 Software Engineering</a:t>
             </a:r>
           </a:p>
         </p:txBody>
@@ -4868,7 +4862,7 @@
           </a:prstGeom>
           <a:extLst>
             <a:ext uri="{C572A759-6A51-4108-AA02-DFA0A04FC94B}">
-              <ma14:wrappingTextBoxFlag xmlns:ma14="http://schemas.microsoft.com/office/mac/drawingml/2011/main" xmlns:a14="http://schemas.microsoft.com/office/drawing/2010/main" xmlns:m="http://schemas.openxmlformats.org/officeDocument/2006/math" xmlns="" val="1"/>
+              <ma14:wrappingTextBoxFlag xmlns="" xmlns:m="http://schemas.openxmlformats.org/officeDocument/2006/math" xmlns:a14="http://schemas.microsoft.com/office/drawing/2010/main" xmlns:ma14="http://schemas.microsoft.com/office/mac/drawingml/2011/main" val="1"/>
             </a:ext>
           </a:extLst>
         </p:spPr>
@@ -4952,7 +4946,7 @@
             <a:effectLst/>
             <a:extLst>
               <a:ext uri="{C572A759-6A51-4108-AA02-DFA0A04FC94B}">
-                <ma14:wrappingTextBoxFlag xmlns:ma14="http://schemas.microsoft.com/office/mac/drawingml/2011/main" xmlns:a14="http://schemas.microsoft.com/office/drawing/2010/main" xmlns:m="http://schemas.openxmlformats.org/officeDocument/2006/math" xmlns="" val="1"/>
+                <ma14:wrappingTextBoxFlag xmlns="" xmlns:m="http://schemas.openxmlformats.org/officeDocument/2006/math" xmlns:a14="http://schemas.microsoft.com/office/drawing/2010/main" xmlns:ma14="http://schemas.microsoft.com/office/mac/drawingml/2011/main" val="1"/>
               </a:ext>
             </a:extLst>
           </p:spPr>
@@ -5007,7 +5001,7 @@
             <a:effectLst/>
             <a:extLst>
               <a:ext uri="{C572A759-6A51-4108-AA02-DFA0A04FC94B}">
-                <ma14:wrappingTextBoxFlag xmlns:ma14="http://schemas.microsoft.com/office/mac/drawingml/2011/main" xmlns:a14="http://schemas.microsoft.com/office/drawing/2010/main" xmlns:m="http://schemas.openxmlformats.org/officeDocument/2006/math" xmlns="" val="1"/>
+                <ma14:wrappingTextBoxFlag xmlns="" xmlns:m="http://schemas.openxmlformats.org/officeDocument/2006/math" xmlns:a14="http://schemas.microsoft.com/office/drawing/2010/main" xmlns:ma14="http://schemas.microsoft.com/office/mac/drawingml/2011/main" val="1"/>
               </a:ext>
             </a:extLst>
           </p:spPr>
@@ -5062,7 +5056,7 @@
             <a:effectLst/>
             <a:extLst>
               <a:ext uri="{C572A759-6A51-4108-AA02-DFA0A04FC94B}">
-                <ma14:wrappingTextBoxFlag xmlns:ma14="http://schemas.microsoft.com/office/mac/drawingml/2011/main" xmlns:a14="http://schemas.microsoft.com/office/drawing/2010/main" xmlns:m="http://schemas.openxmlformats.org/officeDocument/2006/math" xmlns="" val="1"/>
+                <ma14:wrappingTextBoxFlag xmlns="" xmlns:m="http://schemas.openxmlformats.org/officeDocument/2006/math" xmlns:a14="http://schemas.microsoft.com/office/drawing/2010/main" xmlns:ma14="http://schemas.microsoft.com/office/mac/drawingml/2011/main" val="1"/>
               </a:ext>
             </a:extLst>
           </p:spPr>
@@ -5117,7 +5111,7 @@
             <a:effectLst/>
             <a:extLst>
               <a:ext uri="{C572A759-6A51-4108-AA02-DFA0A04FC94B}">
-                <ma14:wrappingTextBoxFlag xmlns:ma14="http://schemas.microsoft.com/office/mac/drawingml/2011/main" xmlns:a14="http://schemas.microsoft.com/office/drawing/2010/main" xmlns:m="http://schemas.openxmlformats.org/officeDocument/2006/math" xmlns="" val="1"/>
+                <ma14:wrappingTextBoxFlag xmlns="" xmlns:m="http://schemas.openxmlformats.org/officeDocument/2006/math" xmlns:a14="http://schemas.microsoft.com/office/drawing/2010/main" xmlns:ma14="http://schemas.microsoft.com/office/mac/drawingml/2011/main" val="1"/>
               </a:ext>
             </a:extLst>
           </p:spPr>
@@ -5216,7 +5210,7 @@
             <a:effectLst/>
             <a:extLst>
               <a:ext uri="{C572A759-6A51-4108-AA02-DFA0A04FC94B}">
-                <ma14:wrappingTextBoxFlag xmlns:ma14="http://schemas.microsoft.com/office/mac/drawingml/2011/main" xmlns:a14="http://schemas.microsoft.com/office/drawing/2010/main" xmlns:m="http://schemas.openxmlformats.org/officeDocument/2006/math" xmlns="" val="1"/>
+                <ma14:wrappingTextBoxFlag xmlns="" xmlns:m="http://schemas.openxmlformats.org/officeDocument/2006/math" xmlns:a14="http://schemas.microsoft.com/office/drawing/2010/main" xmlns:ma14="http://schemas.microsoft.com/office/mac/drawingml/2011/main" val="1"/>
               </a:ext>
             </a:extLst>
           </p:spPr>
@@ -5271,7 +5265,7 @@
             <a:effectLst/>
             <a:extLst>
               <a:ext uri="{C572A759-6A51-4108-AA02-DFA0A04FC94B}">
-                <ma14:wrappingTextBoxFlag xmlns:ma14="http://schemas.microsoft.com/office/mac/drawingml/2011/main" xmlns:a14="http://schemas.microsoft.com/office/drawing/2010/main" xmlns:m="http://schemas.openxmlformats.org/officeDocument/2006/math" xmlns="" val="1"/>
+                <ma14:wrappingTextBoxFlag xmlns="" xmlns:m="http://schemas.openxmlformats.org/officeDocument/2006/math" xmlns:a14="http://schemas.microsoft.com/office/drawing/2010/main" xmlns:ma14="http://schemas.microsoft.com/office/mac/drawingml/2011/main" val="1"/>
               </a:ext>
             </a:extLst>
           </p:spPr>
@@ -5370,7 +5364,7 @@
             <a:effectLst/>
             <a:extLst>
               <a:ext uri="{C572A759-6A51-4108-AA02-DFA0A04FC94B}">
-                <ma14:wrappingTextBoxFlag xmlns:ma14="http://schemas.microsoft.com/office/mac/drawingml/2011/main" xmlns:a14="http://schemas.microsoft.com/office/drawing/2010/main" xmlns:m="http://schemas.openxmlformats.org/officeDocument/2006/math" xmlns="" val="1"/>
+                <ma14:wrappingTextBoxFlag xmlns="" xmlns:m="http://schemas.openxmlformats.org/officeDocument/2006/math" xmlns:a14="http://schemas.microsoft.com/office/drawing/2010/main" xmlns:ma14="http://schemas.microsoft.com/office/mac/drawingml/2011/main" val="1"/>
               </a:ext>
             </a:extLst>
           </p:spPr>
@@ -5425,7 +5419,7 @@
             <a:effectLst/>
             <a:extLst>
               <a:ext uri="{C572A759-6A51-4108-AA02-DFA0A04FC94B}">
-                <ma14:wrappingTextBoxFlag xmlns:ma14="http://schemas.microsoft.com/office/mac/drawingml/2011/main" xmlns:a14="http://schemas.microsoft.com/office/drawing/2010/main" xmlns:m="http://schemas.openxmlformats.org/officeDocument/2006/math" xmlns="" val="1"/>
+                <ma14:wrappingTextBoxFlag xmlns="" xmlns:m="http://schemas.openxmlformats.org/officeDocument/2006/math" xmlns:a14="http://schemas.microsoft.com/office/drawing/2010/main" xmlns:ma14="http://schemas.microsoft.com/office/mac/drawingml/2011/main" val="1"/>
               </a:ext>
             </a:extLst>
           </p:spPr>
@@ -5480,7 +5474,7 @@
             <a:effectLst/>
             <a:extLst>
               <a:ext uri="{C572A759-6A51-4108-AA02-DFA0A04FC94B}">
-                <ma14:wrappingTextBoxFlag xmlns:ma14="http://schemas.microsoft.com/office/mac/drawingml/2011/main" xmlns:a14="http://schemas.microsoft.com/office/drawing/2010/main" xmlns:m="http://schemas.openxmlformats.org/officeDocument/2006/math" xmlns="" val="1"/>
+                <ma14:wrappingTextBoxFlag xmlns="" xmlns:m="http://schemas.openxmlformats.org/officeDocument/2006/math" xmlns:a14="http://schemas.microsoft.com/office/drawing/2010/main" xmlns:ma14="http://schemas.microsoft.com/office/mac/drawingml/2011/main" val="1"/>
               </a:ext>
             </a:extLst>
           </p:spPr>
@@ -5757,7 +5751,7 @@
           </a:ln>
           <a:extLst>
             <a:ext uri="{C572A759-6A51-4108-AA02-DFA0A04FC94B}">
-              <ma14:wrappingTextBoxFlag xmlns:ma14="http://schemas.microsoft.com/office/mac/drawingml/2011/main" xmlns:a14="http://schemas.microsoft.com/office/drawing/2010/main" xmlns:m="http://schemas.openxmlformats.org/officeDocument/2006/math" xmlns="" val="1"/>
+              <ma14:wrappingTextBoxFlag xmlns="" xmlns:m="http://schemas.openxmlformats.org/officeDocument/2006/math" xmlns:a14="http://schemas.microsoft.com/office/drawing/2010/main" xmlns:ma14="http://schemas.microsoft.com/office/mac/drawingml/2011/main" val="1"/>
             </a:ext>
           </a:extLst>
         </p:spPr>
@@ -5872,7 +5866,7 @@
           </a:ln>
           <a:extLst>
             <a:ext uri="{C572A759-6A51-4108-AA02-DFA0A04FC94B}">
-              <ma14:wrappingTextBoxFlag xmlns:ma14="http://schemas.microsoft.com/office/mac/drawingml/2011/main" xmlns:a14="http://schemas.microsoft.com/office/drawing/2010/main" xmlns:m="http://schemas.openxmlformats.org/officeDocument/2006/math" xmlns="" val="1"/>
+              <ma14:wrappingTextBoxFlag xmlns="" xmlns:m="http://schemas.openxmlformats.org/officeDocument/2006/math" xmlns:a14="http://schemas.microsoft.com/office/drawing/2010/main" xmlns:ma14="http://schemas.microsoft.com/office/mac/drawingml/2011/main" val="1"/>
             </a:ext>
           </a:extLst>
         </p:spPr>
@@ -6227,7 +6221,7 @@
           </a:prstGeom>
           <a:extLst>
             <a:ext uri="{C572A759-6A51-4108-AA02-DFA0A04FC94B}">
-              <ma14:wrappingTextBoxFlag xmlns:ma14="http://schemas.microsoft.com/office/mac/drawingml/2011/main" xmlns:a14="http://schemas.microsoft.com/office/drawing/2010/main" xmlns:m="http://schemas.openxmlformats.org/officeDocument/2006/math" xmlns="" val="1"/>
+              <ma14:wrappingTextBoxFlag xmlns="" xmlns:m="http://schemas.openxmlformats.org/officeDocument/2006/math" xmlns:a14="http://schemas.microsoft.com/office/drawing/2010/main" xmlns:ma14="http://schemas.microsoft.com/office/mac/drawingml/2011/main" val="1"/>
             </a:ext>
           </a:extLst>
         </p:spPr>
@@ -6311,7 +6305,7 @@
             <a:effectLst/>
             <a:extLst>
               <a:ext uri="{C572A759-6A51-4108-AA02-DFA0A04FC94B}">
-                <ma14:wrappingTextBoxFlag xmlns:ma14="http://schemas.microsoft.com/office/mac/drawingml/2011/main" xmlns:a14="http://schemas.microsoft.com/office/drawing/2010/main" xmlns:m="http://schemas.openxmlformats.org/officeDocument/2006/math" xmlns="" val="1"/>
+                <ma14:wrappingTextBoxFlag xmlns="" xmlns:m="http://schemas.openxmlformats.org/officeDocument/2006/math" xmlns:a14="http://schemas.microsoft.com/office/drawing/2010/main" xmlns:ma14="http://schemas.microsoft.com/office/mac/drawingml/2011/main" val="1"/>
               </a:ext>
             </a:extLst>
           </p:spPr>
@@ -6403,7 +6397,7 @@
             <a:effectLst/>
             <a:extLst>
               <a:ext uri="{C572A759-6A51-4108-AA02-DFA0A04FC94B}">
-                <ma14:wrappingTextBoxFlag xmlns:ma14="http://schemas.microsoft.com/office/mac/drawingml/2011/main" xmlns:a14="http://schemas.microsoft.com/office/drawing/2010/main" xmlns:m="http://schemas.openxmlformats.org/officeDocument/2006/math" xmlns="" val="1"/>
+                <ma14:wrappingTextBoxFlag xmlns="" xmlns:m="http://schemas.openxmlformats.org/officeDocument/2006/math" xmlns:a14="http://schemas.microsoft.com/office/drawing/2010/main" xmlns:ma14="http://schemas.microsoft.com/office/mac/drawingml/2011/main" val="1"/>
               </a:ext>
             </a:extLst>
           </p:spPr>
@@ -6543,7 +6537,7 @@
               <a:effectLst/>
               <a:extLst>
                 <a:ext uri="{C572A759-6A51-4108-AA02-DFA0A04FC94B}">
-                  <ma14:wrappingTextBoxFlag xmlns:ma14="http://schemas.microsoft.com/office/mac/drawingml/2011/main" xmlns:a14="http://schemas.microsoft.com/office/drawing/2010/main" xmlns:m="http://schemas.openxmlformats.org/officeDocument/2006/math" xmlns="" val="1"/>
+                  <ma14:wrappingTextBoxFlag xmlns="" xmlns:m="http://schemas.openxmlformats.org/officeDocument/2006/math" xmlns:a14="http://schemas.microsoft.com/office/drawing/2010/main" xmlns:ma14="http://schemas.microsoft.com/office/mac/drawingml/2011/main" val="1"/>
                 </a:ext>
               </a:extLst>
             </p:spPr>
@@ -6720,7 +6714,7 @@
               <a:effectLst/>
               <a:extLst>
                 <a:ext uri="{C572A759-6A51-4108-AA02-DFA0A04FC94B}">
-                  <ma14:wrappingTextBoxFlag xmlns:ma14="http://schemas.microsoft.com/office/mac/drawingml/2011/main" xmlns:a14="http://schemas.microsoft.com/office/drawing/2010/main" xmlns:m="http://schemas.openxmlformats.org/officeDocument/2006/math" xmlns="" val="1"/>
+                  <ma14:wrappingTextBoxFlag xmlns="" xmlns:m="http://schemas.openxmlformats.org/officeDocument/2006/math" xmlns:a14="http://schemas.microsoft.com/office/drawing/2010/main" xmlns:ma14="http://schemas.microsoft.com/office/mac/drawingml/2011/main" val="1"/>
                 </a:ext>
               </a:extLst>
             </p:spPr>
@@ -6758,7 +6752,7 @@
               <a:effectLst/>
               <a:extLst>
                 <a:ext uri="{C572A759-6A51-4108-AA02-DFA0A04FC94B}">
-                  <ma14:wrappingTextBoxFlag xmlns:ma14="http://schemas.microsoft.com/office/mac/drawingml/2011/main" xmlns:a14="http://schemas.microsoft.com/office/drawing/2010/main" xmlns:m="http://schemas.openxmlformats.org/officeDocument/2006/math" xmlns="" val="1"/>
+                  <ma14:wrappingTextBoxFlag xmlns="" xmlns:m="http://schemas.openxmlformats.org/officeDocument/2006/math" xmlns:a14="http://schemas.microsoft.com/office/drawing/2010/main" xmlns:ma14="http://schemas.microsoft.com/office/mac/drawingml/2011/main" val="1"/>
                 </a:ext>
               </a:extLst>
             </p:spPr>
@@ -6796,7 +6790,7 @@
               <a:effectLst/>
               <a:extLst>
                 <a:ext uri="{C572A759-6A51-4108-AA02-DFA0A04FC94B}">
-                  <ma14:wrappingTextBoxFlag xmlns:ma14="http://schemas.microsoft.com/office/mac/drawingml/2011/main" xmlns:a14="http://schemas.microsoft.com/office/drawing/2010/main" xmlns:m="http://schemas.openxmlformats.org/officeDocument/2006/math" xmlns="" val="1"/>
+                  <ma14:wrappingTextBoxFlag xmlns="" xmlns:m="http://schemas.openxmlformats.org/officeDocument/2006/math" xmlns:a14="http://schemas.microsoft.com/office/drawing/2010/main" xmlns:ma14="http://schemas.microsoft.com/office/mac/drawingml/2011/main" val="1"/>
                 </a:ext>
               </a:extLst>
             </p:spPr>
@@ -6863,7 +6857,7 @@
               <a:effectLst/>
               <a:extLst>
                 <a:ext uri="{C572A759-6A51-4108-AA02-DFA0A04FC94B}">
-                  <ma14:wrappingTextBoxFlag xmlns:ma14="http://schemas.microsoft.com/office/mac/drawingml/2011/main" xmlns:a14="http://schemas.microsoft.com/office/drawing/2010/main" xmlns:m="http://schemas.openxmlformats.org/officeDocument/2006/math" xmlns="" val="1"/>
+                  <ma14:wrappingTextBoxFlag xmlns="" xmlns:m="http://schemas.openxmlformats.org/officeDocument/2006/math" xmlns:a14="http://schemas.microsoft.com/office/drawing/2010/main" xmlns:ma14="http://schemas.microsoft.com/office/mac/drawingml/2011/main" val="1"/>
                 </a:ext>
               </a:extLst>
             </p:spPr>
@@ -6961,7 +6955,7 @@
           </a:ln>
           <a:extLst>
             <a:ext uri="{C572A759-6A51-4108-AA02-DFA0A04FC94B}">
-              <ma14:wrappingTextBoxFlag xmlns:ma14="http://schemas.microsoft.com/office/mac/drawingml/2011/main" xmlns:a14="http://schemas.microsoft.com/office/drawing/2010/main" xmlns:m="http://schemas.openxmlformats.org/officeDocument/2006/math" xmlns="" val="1"/>
+              <ma14:wrappingTextBoxFlag xmlns="" xmlns:m="http://schemas.openxmlformats.org/officeDocument/2006/math" xmlns:a14="http://schemas.microsoft.com/office/drawing/2010/main" xmlns:ma14="http://schemas.microsoft.com/office/mac/drawingml/2011/main" val="1"/>
             </a:ext>
           </a:extLst>
         </p:spPr>
@@ -7064,7 +7058,7 @@
           </a:prstGeom>
           <a:extLst>
             <a:ext uri="{C572A759-6A51-4108-AA02-DFA0A04FC94B}">
-              <ma14:wrappingTextBoxFlag xmlns:ma14="http://schemas.microsoft.com/office/mac/drawingml/2011/main" xmlns:a14="http://schemas.microsoft.com/office/drawing/2010/main" xmlns:m="http://schemas.openxmlformats.org/officeDocument/2006/math" xmlns="" val="1"/>
+              <ma14:wrappingTextBoxFlag xmlns="" xmlns:m="http://schemas.openxmlformats.org/officeDocument/2006/math" xmlns:a14="http://schemas.microsoft.com/office/drawing/2010/main" xmlns:ma14="http://schemas.microsoft.com/office/mac/drawingml/2011/main" val="1"/>
             </a:ext>
           </a:extLst>
         </p:spPr>
@@ -7185,7 +7179,7 @@
           </a:prstGeom>
           <a:extLst>
             <a:ext uri="{C572A759-6A51-4108-AA02-DFA0A04FC94B}">
-              <ma14:wrappingTextBoxFlag xmlns:ma14="http://schemas.microsoft.com/office/mac/drawingml/2011/main" xmlns:a14="http://schemas.microsoft.com/office/drawing/2010/main" xmlns:m="http://schemas.openxmlformats.org/officeDocument/2006/math" xmlns="" val="1"/>
+              <ma14:wrappingTextBoxFlag xmlns="" xmlns:m="http://schemas.openxmlformats.org/officeDocument/2006/math" xmlns:a14="http://schemas.microsoft.com/office/drawing/2010/main" xmlns:ma14="http://schemas.microsoft.com/office/mac/drawingml/2011/main" val="1"/>
             </a:ext>
           </a:extLst>
         </p:spPr>
@@ -7304,7 +7298,7 @@
           </a:prstGeom>
           <a:extLst>
             <a:ext uri="{C572A759-6A51-4108-AA02-DFA0A04FC94B}">
-              <ma14:wrappingTextBoxFlag xmlns:ma14="http://schemas.microsoft.com/office/mac/drawingml/2011/main" xmlns:a14="http://schemas.microsoft.com/office/drawing/2010/main" xmlns:m="http://schemas.openxmlformats.org/officeDocument/2006/math" xmlns="" val="1"/>
+              <ma14:wrappingTextBoxFlag xmlns="" xmlns:m="http://schemas.openxmlformats.org/officeDocument/2006/math" xmlns:a14="http://schemas.microsoft.com/office/drawing/2010/main" xmlns:ma14="http://schemas.microsoft.com/office/mac/drawingml/2011/main" val="1"/>
             </a:ext>
           </a:extLst>
         </p:spPr>
@@ -7427,7 +7421,7 @@
           </a:prstGeom>
           <a:extLst>
             <a:ext uri="{C572A759-6A51-4108-AA02-DFA0A04FC94B}">
-              <ma14:wrappingTextBoxFlag xmlns:ma14="http://schemas.microsoft.com/office/mac/drawingml/2011/main" xmlns:a14="http://schemas.microsoft.com/office/drawing/2010/main" xmlns:m="http://schemas.openxmlformats.org/officeDocument/2006/math" xmlns="" val="1"/>
+              <ma14:wrappingTextBoxFlag xmlns="" xmlns:m="http://schemas.openxmlformats.org/officeDocument/2006/math" xmlns:a14="http://schemas.microsoft.com/office/drawing/2010/main" xmlns:ma14="http://schemas.microsoft.com/office/mac/drawingml/2011/main" val="1"/>
             </a:ext>
           </a:extLst>
         </p:spPr>
@@ -7567,7 +7561,7 @@
           </a:ln>
           <a:extLst>
             <a:ext uri="{C572A759-6A51-4108-AA02-DFA0A04FC94B}">
-              <ma14:wrappingTextBoxFlag xmlns:ma14="http://schemas.microsoft.com/office/mac/drawingml/2011/main" xmlns:a14="http://schemas.microsoft.com/office/drawing/2010/main" xmlns:m="http://schemas.openxmlformats.org/officeDocument/2006/math" xmlns="" val="1"/>
+              <ma14:wrappingTextBoxFlag xmlns="" xmlns:m="http://schemas.openxmlformats.org/officeDocument/2006/math" xmlns:a14="http://schemas.microsoft.com/office/drawing/2010/main" xmlns:ma14="http://schemas.microsoft.com/office/mac/drawingml/2011/main" val="1"/>
             </a:ext>
           </a:extLst>
         </p:spPr>
@@ -7656,7 +7650,7 @@
             <a:effectLst/>
             <a:extLst>
               <a:ext uri="{C572A759-6A51-4108-AA02-DFA0A04FC94B}">
-                <ma14:wrappingTextBoxFlag xmlns:ma14="http://schemas.microsoft.com/office/mac/drawingml/2011/main" xmlns:a14="http://schemas.microsoft.com/office/drawing/2010/main" xmlns:m="http://schemas.openxmlformats.org/officeDocument/2006/math" xmlns="" val="1"/>
+                <ma14:wrappingTextBoxFlag xmlns="" xmlns:m="http://schemas.openxmlformats.org/officeDocument/2006/math" xmlns:a14="http://schemas.microsoft.com/office/drawing/2010/main" xmlns:ma14="http://schemas.microsoft.com/office/mac/drawingml/2011/main" val="1"/>
               </a:ext>
             </a:extLst>
           </p:spPr>
@@ -7733,7 +7727,7 @@
           </a:ln>
           <a:extLst>
             <a:ext uri="{C572A759-6A51-4108-AA02-DFA0A04FC94B}">
-              <ma14:wrappingTextBoxFlag xmlns:ma14="http://schemas.microsoft.com/office/mac/drawingml/2011/main" xmlns:a14="http://schemas.microsoft.com/office/drawing/2010/main" xmlns:m="http://schemas.openxmlformats.org/officeDocument/2006/math" xmlns="" val="1"/>
+              <ma14:wrappingTextBoxFlag xmlns="" xmlns:m="http://schemas.openxmlformats.org/officeDocument/2006/math" xmlns:a14="http://schemas.microsoft.com/office/drawing/2010/main" xmlns:ma14="http://schemas.microsoft.com/office/mac/drawingml/2011/main" val="1"/>
             </a:ext>
           </a:extLst>
         </p:spPr>
@@ -7768,7 +7762,7 @@
           </a:ln>
           <a:extLst>
             <a:ext uri="{C572A759-6A51-4108-AA02-DFA0A04FC94B}">
-              <ma14:wrappingTextBoxFlag xmlns:ma14="http://schemas.microsoft.com/office/mac/drawingml/2011/main" xmlns:a14="http://schemas.microsoft.com/office/drawing/2010/main" xmlns:m="http://schemas.openxmlformats.org/officeDocument/2006/math" xmlns="" val="1"/>
+              <ma14:wrappingTextBoxFlag xmlns="" xmlns:m="http://schemas.openxmlformats.org/officeDocument/2006/math" xmlns:a14="http://schemas.microsoft.com/office/drawing/2010/main" xmlns:ma14="http://schemas.microsoft.com/office/mac/drawingml/2011/main" val="1"/>
             </a:ext>
           </a:extLst>
         </p:spPr>
@@ -7849,7 +7843,7 @@
             <a:effectLst/>
             <a:extLst>
               <a:ext uri="{C572A759-6A51-4108-AA02-DFA0A04FC94B}">
-                <ma14:wrappingTextBoxFlag xmlns:ma14="http://schemas.microsoft.com/office/mac/drawingml/2011/main" xmlns:a14="http://schemas.microsoft.com/office/drawing/2010/main" xmlns:m="http://schemas.openxmlformats.org/officeDocument/2006/math" xmlns="" val="1"/>
+                <ma14:wrappingTextBoxFlag xmlns="" xmlns:m="http://schemas.openxmlformats.org/officeDocument/2006/math" xmlns:a14="http://schemas.microsoft.com/office/drawing/2010/main" xmlns:ma14="http://schemas.microsoft.com/office/mac/drawingml/2011/main" val="1"/>
               </a:ext>
             </a:extLst>
           </p:spPr>
@@ -8232,7 +8226,7 @@
           </a:prstGeom>
           <a:extLst>
             <a:ext uri="{C572A759-6A51-4108-AA02-DFA0A04FC94B}">
-              <ma14:wrappingTextBoxFlag xmlns:ma14="http://schemas.microsoft.com/office/mac/drawingml/2011/main" xmlns:a14="http://schemas.microsoft.com/office/drawing/2010/main" xmlns:m="http://schemas.openxmlformats.org/officeDocument/2006/math" xmlns="" val="1"/>
+              <ma14:wrappingTextBoxFlag xmlns="" xmlns:m="http://schemas.openxmlformats.org/officeDocument/2006/math" xmlns:a14="http://schemas.microsoft.com/office/drawing/2010/main" xmlns:ma14="http://schemas.microsoft.com/office/mac/drawingml/2011/main" val="1"/>
             </a:ext>
           </a:extLst>
         </p:spPr>
@@ -8358,7 +8352,7 @@
           </a:ln>
           <a:extLst>
             <a:ext uri="{C572A759-6A51-4108-AA02-DFA0A04FC94B}">
-              <ma14:wrappingTextBoxFlag xmlns:ma14="http://schemas.microsoft.com/office/mac/drawingml/2011/main" xmlns:a14="http://schemas.microsoft.com/office/drawing/2010/main" xmlns:m="http://schemas.openxmlformats.org/officeDocument/2006/math" xmlns="" val="1"/>
+              <ma14:wrappingTextBoxFlag xmlns="" xmlns:m="http://schemas.openxmlformats.org/officeDocument/2006/math" xmlns:a14="http://schemas.microsoft.com/office/drawing/2010/main" xmlns:ma14="http://schemas.microsoft.com/office/mac/drawingml/2011/main" val="1"/>
             </a:ext>
           </a:extLst>
         </p:spPr>
@@ -8447,7 +8441,7 @@
             <a:effectLst/>
             <a:extLst>
               <a:ext uri="{C572A759-6A51-4108-AA02-DFA0A04FC94B}">
-                <ma14:wrappingTextBoxFlag xmlns:ma14="http://schemas.microsoft.com/office/mac/drawingml/2011/main" xmlns:a14="http://schemas.microsoft.com/office/drawing/2010/main" xmlns:m="http://schemas.openxmlformats.org/officeDocument/2006/math" xmlns="" val="1"/>
+                <ma14:wrappingTextBoxFlag xmlns="" xmlns:m="http://schemas.openxmlformats.org/officeDocument/2006/math" xmlns:a14="http://schemas.microsoft.com/office/drawing/2010/main" xmlns:ma14="http://schemas.microsoft.com/office/mac/drawingml/2011/main" val="1"/>
               </a:ext>
             </a:extLst>
           </p:spPr>
@@ -8570,7 +8564,7 @@
             <a:effectLst/>
             <a:extLst>
               <a:ext uri="{C572A759-6A51-4108-AA02-DFA0A04FC94B}">
-                <ma14:wrappingTextBoxFlag xmlns:ma14="http://schemas.microsoft.com/office/mac/drawingml/2011/main" xmlns:a14="http://schemas.microsoft.com/office/drawing/2010/main" xmlns:m="http://schemas.openxmlformats.org/officeDocument/2006/math" xmlns="" val="1"/>
+                <ma14:wrappingTextBoxFlag xmlns="" xmlns:m="http://schemas.openxmlformats.org/officeDocument/2006/math" xmlns:a14="http://schemas.microsoft.com/office/drawing/2010/main" xmlns:ma14="http://schemas.microsoft.com/office/mac/drawingml/2011/main" val="1"/>
               </a:ext>
             </a:extLst>
           </p:spPr>
@@ -8663,7 +8657,7 @@
             <a:effectLst/>
             <a:extLst>
               <a:ext uri="{C572A759-6A51-4108-AA02-DFA0A04FC94B}">
-                <ma14:wrappingTextBoxFlag xmlns:ma14="http://schemas.microsoft.com/office/mac/drawingml/2011/main" xmlns:a14="http://schemas.microsoft.com/office/drawing/2010/main" xmlns:m="http://schemas.openxmlformats.org/officeDocument/2006/math" xmlns="" val="1"/>
+                <ma14:wrappingTextBoxFlag xmlns="" xmlns:m="http://schemas.openxmlformats.org/officeDocument/2006/math" xmlns:a14="http://schemas.microsoft.com/office/drawing/2010/main" xmlns:ma14="http://schemas.microsoft.com/office/mac/drawingml/2011/main" val="1"/>
               </a:ext>
             </a:extLst>
           </p:spPr>
@@ -8756,7 +8750,7 @@
             <a:effectLst/>
             <a:extLst>
               <a:ext uri="{C572A759-6A51-4108-AA02-DFA0A04FC94B}">
-                <ma14:wrappingTextBoxFlag xmlns:ma14="http://schemas.microsoft.com/office/mac/drawingml/2011/main" xmlns:a14="http://schemas.microsoft.com/office/drawing/2010/main" xmlns:m="http://schemas.openxmlformats.org/officeDocument/2006/math" xmlns="" val="1"/>
+                <ma14:wrappingTextBoxFlag xmlns="" xmlns:m="http://schemas.openxmlformats.org/officeDocument/2006/math" xmlns:a14="http://schemas.microsoft.com/office/drawing/2010/main" xmlns:ma14="http://schemas.microsoft.com/office/mac/drawingml/2011/main" val="1"/>
               </a:ext>
             </a:extLst>
           </p:spPr>
@@ -8849,7 +8843,7 @@
             <a:effectLst/>
             <a:extLst>
               <a:ext uri="{C572A759-6A51-4108-AA02-DFA0A04FC94B}">
-                <ma14:wrappingTextBoxFlag xmlns:ma14="http://schemas.microsoft.com/office/mac/drawingml/2011/main" xmlns:a14="http://schemas.microsoft.com/office/drawing/2010/main" xmlns:m="http://schemas.openxmlformats.org/officeDocument/2006/math" xmlns="" val="1"/>
+                <ma14:wrappingTextBoxFlag xmlns="" xmlns:m="http://schemas.openxmlformats.org/officeDocument/2006/math" xmlns:a14="http://schemas.microsoft.com/office/drawing/2010/main" xmlns:ma14="http://schemas.microsoft.com/office/mac/drawingml/2011/main" val="1"/>
               </a:ext>
             </a:extLst>
           </p:spPr>
@@ -8942,7 +8936,7 @@
             <a:effectLst/>
             <a:extLst>
               <a:ext uri="{C572A759-6A51-4108-AA02-DFA0A04FC94B}">
-                <ma14:wrappingTextBoxFlag xmlns:ma14="http://schemas.microsoft.com/office/mac/drawingml/2011/main" xmlns:a14="http://schemas.microsoft.com/office/drawing/2010/main" xmlns:m="http://schemas.openxmlformats.org/officeDocument/2006/math" xmlns="" val="1"/>
+                <ma14:wrappingTextBoxFlag xmlns="" xmlns:m="http://schemas.openxmlformats.org/officeDocument/2006/math" xmlns:a14="http://schemas.microsoft.com/office/drawing/2010/main" xmlns:ma14="http://schemas.microsoft.com/office/mac/drawingml/2011/main" val="1"/>
               </a:ext>
             </a:extLst>
           </p:spPr>
@@ -9035,7 +9029,7 @@
             <a:effectLst/>
             <a:extLst>
               <a:ext uri="{C572A759-6A51-4108-AA02-DFA0A04FC94B}">
-                <ma14:wrappingTextBoxFlag xmlns:ma14="http://schemas.microsoft.com/office/mac/drawingml/2011/main" xmlns:a14="http://schemas.microsoft.com/office/drawing/2010/main" xmlns:m="http://schemas.openxmlformats.org/officeDocument/2006/math" xmlns="" val="1"/>
+                <ma14:wrappingTextBoxFlag xmlns="" xmlns:m="http://schemas.openxmlformats.org/officeDocument/2006/math" xmlns:a14="http://schemas.microsoft.com/office/drawing/2010/main" xmlns:ma14="http://schemas.microsoft.com/office/mac/drawingml/2011/main" val="1"/>
               </a:ext>
             </a:extLst>
           </p:spPr>
@@ -9128,7 +9122,7 @@
             <a:effectLst/>
             <a:extLst>
               <a:ext uri="{C572A759-6A51-4108-AA02-DFA0A04FC94B}">
-                <ma14:wrappingTextBoxFlag xmlns:ma14="http://schemas.microsoft.com/office/mac/drawingml/2011/main" xmlns:a14="http://schemas.microsoft.com/office/drawing/2010/main" xmlns:m="http://schemas.openxmlformats.org/officeDocument/2006/math" xmlns="" val="1"/>
+                <ma14:wrappingTextBoxFlag xmlns="" xmlns:m="http://schemas.openxmlformats.org/officeDocument/2006/math" xmlns:a14="http://schemas.microsoft.com/office/drawing/2010/main" xmlns:ma14="http://schemas.microsoft.com/office/mac/drawingml/2011/main" val="1"/>
               </a:ext>
             </a:extLst>
           </p:spPr>
@@ -9221,7 +9215,7 @@
             <a:effectLst/>
             <a:extLst>
               <a:ext uri="{C572A759-6A51-4108-AA02-DFA0A04FC94B}">
-                <ma14:wrappingTextBoxFlag xmlns:ma14="http://schemas.microsoft.com/office/mac/drawingml/2011/main" xmlns:a14="http://schemas.microsoft.com/office/drawing/2010/main" xmlns:m="http://schemas.openxmlformats.org/officeDocument/2006/math" xmlns="" val="1"/>
+                <ma14:wrappingTextBoxFlag xmlns="" xmlns:m="http://schemas.openxmlformats.org/officeDocument/2006/math" xmlns:a14="http://schemas.microsoft.com/office/drawing/2010/main" xmlns:ma14="http://schemas.microsoft.com/office/mac/drawingml/2011/main" val="1"/>
               </a:ext>
             </a:extLst>
           </p:spPr>
@@ -9314,7 +9308,7 @@
             <a:effectLst/>
             <a:extLst>
               <a:ext uri="{C572A759-6A51-4108-AA02-DFA0A04FC94B}">
-                <ma14:wrappingTextBoxFlag xmlns:ma14="http://schemas.microsoft.com/office/mac/drawingml/2011/main" xmlns:a14="http://schemas.microsoft.com/office/drawing/2010/main" xmlns:m="http://schemas.openxmlformats.org/officeDocument/2006/math" xmlns="" val="1"/>
+                <ma14:wrappingTextBoxFlag xmlns="" xmlns:m="http://schemas.openxmlformats.org/officeDocument/2006/math" xmlns:a14="http://schemas.microsoft.com/office/drawing/2010/main" xmlns:ma14="http://schemas.microsoft.com/office/mac/drawingml/2011/main" val="1"/>
               </a:ext>
             </a:extLst>
           </p:spPr>
@@ -9364,7 +9358,7 @@
           </a:ln>
           <a:extLst>
             <a:ext uri="{C572A759-6A51-4108-AA02-DFA0A04FC94B}">
-              <ma14:wrappingTextBoxFlag xmlns:ma14="http://schemas.microsoft.com/office/mac/drawingml/2011/main" xmlns:a14="http://schemas.microsoft.com/office/drawing/2010/main" xmlns:m="http://schemas.openxmlformats.org/officeDocument/2006/math" xmlns="" val="1"/>
+              <ma14:wrappingTextBoxFlag xmlns="" xmlns:m="http://schemas.openxmlformats.org/officeDocument/2006/math" xmlns:a14="http://schemas.microsoft.com/office/drawing/2010/main" xmlns:ma14="http://schemas.microsoft.com/office/mac/drawingml/2011/main" val="1"/>
             </a:ext>
           </a:extLst>
         </p:spPr>
@@ -9413,7 +9407,7 @@
           </a:ln>
           <a:extLst>
             <a:ext uri="{C572A759-6A51-4108-AA02-DFA0A04FC94B}">
-              <ma14:wrappingTextBoxFlag xmlns:ma14="http://schemas.microsoft.com/office/mac/drawingml/2011/main" xmlns:a14="http://schemas.microsoft.com/office/drawing/2010/main" xmlns:m="http://schemas.openxmlformats.org/officeDocument/2006/math" xmlns="" val="1"/>
+              <ma14:wrappingTextBoxFlag xmlns="" xmlns:m="http://schemas.openxmlformats.org/officeDocument/2006/math" xmlns:a14="http://schemas.microsoft.com/office/drawing/2010/main" xmlns:ma14="http://schemas.microsoft.com/office/mac/drawingml/2011/main" val="1"/>
             </a:ext>
           </a:extLst>
         </p:spPr>
@@ -9462,7 +9456,7 @@
           </a:ln>
           <a:extLst>
             <a:ext uri="{C572A759-6A51-4108-AA02-DFA0A04FC94B}">
-              <ma14:wrappingTextBoxFlag xmlns:ma14="http://schemas.microsoft.com/office/mac/drawingml/2011/main" xmlns:a14="http://schemas.microsoft.com/office/drawing/2010/main" xmlns:m="http://schemas.openxmlformats.org/officeDocument/2006/math" xmlns="" val="1"/>
+              <ma14:wrappingTextBoxFlag xmlns="" xmlns:m="http://schemas.openxmlformats.org/officeDocument/2006/math" xmlns:a14="http://schemas.microsoft.com/office/drawing/2010/main" xmlns:ma14="http://schemas.microsoft.com/office/mac/drawingml/2011/main" val="1"/>
             </a:ext>
           </a:extLst>
         </p:spPr>
@@ -9511,7 +9505,7 @@
           </a:ln>
           <a:extLst>
             <a:ext uri="{C572A759-6A51-4108-AA02-DFA0A04FC94B}">
-              <ma14:wrappingTextBoxFlag xmlns:ma14="http://schemas.microsoft.com/office/mac/drawingml/2011/main" xmlns:a14="http://schemas.microsoft.com/office/drawing/2010/main" xmlns:m="http://schemas.openxmlformats.org/officeDocument/2006/math" xmlns="" val="1"/>
+              <ma14:wrappingTextBoxFlag xmlns="" xmlns:m="http://schemas.openxmlformats.org/officeDocument/2006/math" xmlns:a14="http://schemas.microsoft.com/office/drawing/2010/main" xmlns:ma14="http://schemas.microsoft.com/office/mac/drawingml/2011/main" val="1"/>
             </a:ext>
           </a:extLst>
         </p:spPr>
@@ -9560,7 +9554,7 @@
           </a:ln>
           <a:extLst>
             <a:ext uri="{C572A759-6A51-4108-AA02-DFA0A04FC94B}">
-              <ma14:wrappingTextBoxFlag xmlns:ma14="http://schemas.microsoft.com/office/mac/drawingml/2011/main" xmlns:a14="http://schemas.microsoft.com/office/drawing/2010/main" xmlns:m="http://schemas.openxmlformats.org/officeDocument/2006/math" xmlns="" val="1"/>
+              <ma14:wrappingTextBoxFlag xmlns="" xmlns:m="http://schemas.openxmlformats.org/officeDocument/2006/math" xmlns:a14="http://schemas.microsoft.com/office/drawing/2010/main" xmlns:ma14="http://schemas.microsoft.com/office/mac/drawingml/2011/main" val="1"/>
             </a:ext>
           </a:extLst>
         </p:spPr>
@@ -9609,7 +9603,7 @@
           </a:ln>
           <a:extLst>
             <a:ext uri="{C572A759-6A51-4108-AA02-DFA0A04FC94B}">
-              <ma14:wrappingTextBoxFlag xmlns:ma14="http://schemas.microsoft.com/office/mac/drawingml/2011/main" xmlns:a14="http://schemas.microsoft.com/office/drawing/2010/main" xmlns:m="http://schemas.openxmlformats.org/officeDocument/2006/math" xmlns="" val="1"/>
+              <ma14:wrappingTextBoxFlag xmlns="" xmlns:m="http://schemas.openxmlformats.org/officeDocument/2006/math" xmlns:a14="http://schemas.microsoft.com/office/drawing/2010/main" xmlns:ma14="http://schemas.microsoft.com/office/mac/drawingml/2011/main" val="1"/>
             </a:ext>
           </a:extLst>
         </p:spPr>
@@ -9658,7 +9652,7 @@
           </a:ln>
           <a:extLst>
             <a:ext uri="{C572A759-6A51-4108-AA02-DFA0A04FC94B}">
-              <ma14:wrappingTextBoxFlag xmlns:ma14="http://schemas.microsoft.com/office/mac/drawingml/2011/main" xmlns:a14="http://schemas.microsoft.com/office/drawing/2010/main" xmlns:m="http://schemas.openxmlformats.org/officeDocument/2006/math" xmlns="" val="1"/>
+              <ma14:wrappingTextBoxFlag xmlns="" xmlns:m="http://schemas.openxmlformats.org/officeDocument/2006/math" xmlns:a14="http://schemas.microsoft.com/office/drawing/2010/main" xmlns:ma14="http://schemas.microsoft.com/office/mac/drawingml/2011/main" val="1"/>
             </a:ext>
           </a:extLst>
         </p:spPr>
@@ -9707,7 +9701,7 @@
           </a:ln>
           <a:extLst>
             <a:ext uri="{C572A759-6A51-4108-AA02-DFA0A04FC94B}">
-              <ma14:wrappingTextBoxFlag xmlns:ma14="http://schemas.microsoft.com/office/mac/drawingml/2011/main" xmlns:a14="http://schemas.microsoft.com/office/drawing/2010/main" xmlns:m="http://schemas.openxmlformats.org/officeDocument/2006/math" xmlns="" val="1"/>
+              <ma14:wrappingTextBoxFlag xmlns="" xmlns:m="http://schemas.openxmlformats.org/officeDocument/2006/math" xmlns:a14="http://schemas.microsoft.com/office/drawing/2010/main" xmlns:ma14="http://schemas.microsoft.com/office/mac/drawingml/2011/main" val="1"/>
             </a:ext>
           </a:extLst>
         </p:spPr>
@@ -9756,7 +9750,7 @@
           </a:ln>
           <a:extLst>
             <a:ext uri="{C572A759-6A51-4108-AA02-DFA0A04FC94B}">
-              <ma14:wrappingTextBoxFlag xmlns:ma14="http://schemas.microsoft.com/office/mac/drawingml/2011/main" xmlns:a14="http://schemas.microsoft.com/office/drawing/2010/main" xmlns:m="http://schemas.openxmlformats.org/officeDocument/2006/math" xmlns="" val="1"/>
+              <ma14:wrappingTextBoxFlag xmlns="" xmlns:m="http://schemas.openxmlformats.org/officeDocument/2006/math" xmlns:a14="http://schemas.microsoft.com/office/drawing/2010/main" xmlns:ma14="http://schemas.microsoft.com/office/mac/drawingml/2011/main" val="1"/>
             </a:ext>
           </a:extLst>
         </p:spPr>
@@ -9805,7 +9799,7 @@
           </a:ln>
           <a:extLst>
             <a:ext uri="{C572A759-6A51-4108-AA02-DFA0A04FC94B}">
-              <ma14:wrappingTextBoxFlag xmlns:ma14="http://schemas.microsoft.com/office/mac/drawingml/2011/main" xmlns:a14="http://schemas.microsoft.com/office/drawing/2010/main" xmlns:m="http://schemas.openxmlformats.org/officeDocument/2006/math" xmlns="" val="1"/>
+              <ma14:wrappingTextBoxFlag xmlns="" xmlns:m="http://schemas.openxmlformats.org/officeDocument/2006/math" xmlns:a14="http://schemas.microsoft.com/office/drawing/2010/main" xmlns:ma14="http://schemas.microsoft.com/office/mac/drawingml/2011/main" val="1"/>
             </a:ext>
           </a:extLst>
         </p:spPr>
@@ -16531,7 +16525,7 @@
           </a:prstGeom>
           <a:extLst>
             <a:ext uri="{C572A759-6A51-4108-AA02-DFA0A04FC94B}">
-              <ma14:wrappingTextBoxFlag xmlns:ma14="http://schemas.microsoft.com/office/mac/drawingml/2011/main" xmlns:a14="http://schemas.microsoft.com/office/drawing/2010/main" xmlns:m="http://schemas.openxmlformats.org/officeDocument/2006/math" xmlns="" val="1"/>
+              <ma14:wrappingTextBoxFlag xmlns="" xmlns:m="http://schemas.openxmlformats.org/officeDocument/2006/math" xmlns:a14="http://schemas.microsoft.com/office/drawing/2010/main" xmlns:ma14="http://schemas.microsoft.com/office/mac/drawingml/2011/main" val="1"/>
             </a:ext>
           </a:extLst>
         </p:spPr>
@@ -16672,7 +16666,7 @@
             <a:effectLst/>
             <a:extLst>
               <a:ext uri="{C572A759-6A51-4108-AA02-DFA0A04FC94B}">
-                <ma14:wrappingTextBoxFlag xmlns:ma14="http://schemas.microsoft.com/office/mac/drawingml/2011/main" xmlns:a14="http://schemas.microsoft.com/office/drawing/2010/main" xmlns:m="http://schemas.openxmlformats.org/officeDocument/2006/math" xmlns="" val="1"/>
+                <ma14:wrappingTextBoxFlag xmlns="" xmlns:m="http://schemas.openxmlformats.org/officeDocument/2006/math" xmlns:a14="http://schemas.microsoft.com/office/drawing/2010/main" xmlns:ma14="http://schemas.microsoft.com/office/mac/drawingml/2011/main" val="1"/>
               </a:ext>
             </a:extLst>
           </p:spPr>
@@ -16915,7 +16909,7 @@
           </a:ln>
           <a:extLst>
             <a:ext uri="{C572A759-6A51-4108-AA02-DFA0A04FC94B}">
-              <ma14:wrappingTextBoxFlag xmlns:ma14="http://schemas.microsoft.com/office/mac/drawingml/2011/main" xmlns:a14="http://schemas.microsoft.com/office/drawing/2010/main" xmlns:m="http://schemas.openxmlformats.org/officeDocument/2006/math" xmlns="" val="1"/>
+              <ma14:wrappingTextBoxFlag xmlns="" xmlns:m="http://schemas.openxmlformats.org/officeDocument/2006/math" xmlns:a14="http://schemas.microsoft.com/office/drawing/2010/main" xmlns:ma14="http://schemas.microsoft.com/office/mac/drawingml/2011/main" val="1"/>
             </a:ext>
           </a:extLst>
         </p:spPr>
@@ -16950,7 +16944,7 @@
           </a:ln>
           <a:extLst>
             <a:ext uri="{C572A759-6A51-4108-AA02-DFA0A04FC94B}">
-              <ma14:wrappingTextBoxFlag xmlns:ma14="http://schemas.microsoft.com/office/mac/drawingml/2011/main" xmlns:a14="http://schemas.microsoft.com/office/drawing/2010/main" xmlns:m="http://schemas.openxmlformats.org/officeDocument/2006/math" xmlns="" val="1"/>
+              <ma14:wrappingTextBoxFlag xmlns="" xmlns:m="http://schemas.openxmlformats.org/officeDocument/2006/math" xmlns:a14="http://schemas.microsoft.com/office/drawing/2010/main" xmlns:ma14="http://schemas.microsoft.com/office/mac/drawingml/2011/main" val="1"/>
             </a:ext>
           </a:extLst>
         </p:spPr>
@@ -17085,7 +17079,7 @@
           </a:prstGeom>
           <a:extLst>
             <a:ext uri="{C572A759-6A51-4108-AA02-DFA0A04FC94B}">
-              <ma14:wrappingTextBoxFlag xmlns:ma14="http://schemas.microsoft.com/office/mac/drawingml/2011/main" xmlns:a14="http://schemas.microsoft.com/office/drawing/2010/main" xmlns:m="http://schemas.openxmlformats.org/officeDocument/2006/math" xmlns="" val="1"/>
+              <ma14:wrappingTextBoxFlag xmlns="" xmlns:m="http://schemas.openxmlformats.org/officeDocument/2006/math" xmlns:a14="http://schemas.microsoft.com/office/drawing/2010/main" xmlns:ma14="http://schemas.microsoft.com/office/mac/drawingml/2011/main" val="1"/>
             </a:ext>
           </a:extLst>
         </p:spPr>
@@ -17164,7 +17158,7 @@
             <a:effectLst/>
             <a:extLst>
               <a:ext uri="{C572A759-6A51-4108-AA02-DFA0A04FC94B}">
-                <ma14:wrappingTextBoxFlag xmlns:ma14="http://schemas.microsoft.com/office/mac/drawingml/2011/main" xmlns:a14="http://schemas.microsoft.com/office/drawing/2010/main" xmlns:m="http://schemas.openxmlformats.org/officeDocument/2006/math" xmlns="" val="1"/>
+                <ma14:wrappingTextBoxFlag xmlns="" xmlns:m="http://schemas.openxmlformats.org/officeDocument/2006/math" xmlns:a14="http://schemas.microsoft.com/office/drawing/2010/main" xmlns:ma14="http://schemas.microsoft.com/office/mac/drawingml/2011/main" val="1"/>
               </a:ext>
             </a:extLst>
           </p:spPr>
@@ -17377,7 +17371,7 @@
           </a:ln>
           <a:extLst>
             <a:ext uri="{C572A759-6A51-4108-AA02-DFA0A04FC94B}">
-              <ma14:wrappingTextBoxFlag xmlns:ma14="http://schemas.microsoft.com/office/mac/drawingml/2011/main" xmlns:a14="http://schemas.microsoft.com/office/drawing/2010/main" xmlns:m="http://schemas.openxmlformats.org/officeDocument/2006/math" xmlns="" val="1"/>
+              <ma14:wrappingTextBoxFlag xmlns="" xmlns:m="http://schemas.openxmlformats.org/officeDocument/2006/math" xmlns:a14="http://schemas.microsoft.com/office/drawing/2010/main" xmlns:ma14="http://schemas.microsoft.com/office/mac/drawingml/2011/main" val="1"/>
             </a:ext>
           </a:extLst>
         </p:spPr>
@@ -17418,7 +17412,7 @@
           </a:ln>
           <a:extLst>
             <a:ext uri="{C572A759-6A51-4108-AA02-DFA0A04FC94B}">
-              <ma14:wrappingTextBoxFlag xmlns:ma14="http://schemas.microsoft.com/office/mac/drawingml/2011/main" xmlns:a14="http://schemas.microsoft.com/office/drawing/2010/main" xmlns:m="http://schemas.openxmlformats.org/officeDocument/2006/math" xmlns="" val="1"/>
+              <ma14:wrappingTextBoxFlag xmlns="" xmlns:m="http://schemas.openxmlformats.org/officeDocument/2006/math" xmlns:a14="http://schemas.microsoft.com/office/drawing/2010/main" xmlns:ma14="http://schemas.microsoft.com/office/mac/drawingml/2011/main" val="1"/>
             </a:ext>
           </a:extLst>
         </p:spPr>
@@ -17469,7 +17463,7 @@
           </a:ln>
           <a:extLst>
             <a:ext uri="{C572A759-6A51-4108-AA02-DFA0A04FC94B}">
-              <ma14:wrappingTextBoxFlag xmlns:ma14="http://schemas.microsoft.com/office/mac/drawingml/2011/main" xmlns:a14="http://schemas.microsoft.com/office/drawing/2010/main" xmlns:m="http://schemas.openxmlformats.org/officeDocument/2006/math" xmlns="" val="1"/>
+              <ma14:wrappingTextBoxFlag xmlns="" xmlns:m="http://schemas.openxmlformats.org/officeDocument/2006/math" xmlns:a14="http://schemas.microsoft.com/office/drawing/2010/main" xmlns:ma14="http://schemas.microsoft.com/office/mac/drawingml/2011/main" val="1"/>
             </a:ext>
           </a:extLst>
         </p:spPr>
@@ -17520,7 +17514,7 @@
           </a:ln>
           <a:extLst>
             <a:ext uri="{C572A759-6A51-4108-AA02-DFA0A04FC94B}">
-              <ma14:wrappingTextBoxFlag xmlns:ma14="http://schemas.microsoft.com/office/mac/drawingml/2011/main" xmlns:a14="http://schemas.microsoft.com/office/drawing/2010/main" xmlns:m="http://schemas.openxmlformats.org/officeDocument/2006/math" xmlns="" val="1"/>
+              <ma14:wrappingTextBoxFlag xmlns="" xmlns:m="http://schemas.openxmlformats.org/officeDocument/2006/math" xmlns:a14="http://schemas.microsoft.com/office/drawing/2010/main" xmlns:ma14="http://schemas.microsoft.com/office/mac/drawingml/2011/main" val="1"/>
             </a:ext>
           </a:extLst>
         </p:spPr>
@@ -17571,7 +17565,7 @@
           </a:ln>
           <a:extLst>
             <a:ext uri="{C572A759-6A51-4108-AA02-DFA0A04FC94B}">
-              <ma14:wrappingTextBoxFlag xmlns:ma14="http://schemas.microsoft.com/office/mac/drawingml/2011/main" xmlns:a14="http://schemas.microsoft.com/office/drawing/2010/main" xmlns:m="http://schemas.openxmlformats.org/officeDocument/2006/math" xmlns="" val="1"/>
+              <ma14:wrappingTextBoxFlag xmlns="" xmlns:m="http://schemas.openxmlformats.org/officeDocument/2006/math" xmlns:a14="http://schemas.microsoft.com/office/drawing/2010/main" xmlns:ma14="http://schemas.microsoft.com/office/mac/drawingml/2011/main" val="1"/>
             </a:ext>
           </a:extLst>
         </p:spPr>
@@ -17622,7 +17616,7 @@
           </a:ln>
           <a:extLst>
             <a:ext uri="{C572A759-6A51-4108-AA02-DFA0A04FC94B}">
-              <ma14:wrappingTextBoxFlag xmlns:ma14="http://schemas.microsoft.com/office/mac/drawingml/2011/main" xmlns:a14="http://schemas.microsoft.com/office/drawing/2010/main" xmlns:m="http://schemas.openxmlformats.org/officeDocument/2006/math" xmlns="" val="1"/>
+              <ma14:wrappingTextBoxFlag xmlns="" xmlns:m="http://schemas.openxmlformats.org/officeDocument/2006/math" xmlns:a14="http://schemas.microsoft.com/office/drawing/2010/main" xmlns:ma14="http://schemas.microsoft.com/office/mac/drawingml/2011/main" val="1"/>
             </a:ext>
           </a:extLst>
         </p:spPr>
@@ -17673,7 +17667,7 @@
           </a:ln>
           <a:extLst>
             <a:ext uri="{C572A759-6A51-4108-AA02-DFA0A04FC94B}">
-              <ma14:wrappingTextBoxFlag xmlns:ma14="http://schemas.microsoft.com/office/mac/drawingml/2011/main" xmlns:a14="http://schemas.microsoft.com/office/drawing/2010/main" xmlns:m="http://schemas.openxmlformats.org/officeDocument/2006/math" xmlns="" val="1"/>
+              <ma14:wrappingTextBoxFlag xmlns="" xmlns:m="http://schemas.openxmlformats.org/officeDocument/2006/math" xmlns:a14="http://schemas.microsoft.com/office/drawing/2010/main" xmlns:ma14="http://schemas.microsoft.com/office/mac/drawingml/2011/main" val="1"/>
             </a:ext>
           </a:extLst>
         </p:spPr>
@@ -17745,7 +17739,7 @@
           </a:ln>
           <a:extLst>
             <a:ext uri="{C572A759-6A51-4108-AA02-DFA0A04FC94B}">
-              <ma14:wrappingTextBoxFlag xmlns:ma14="http://schemas.microsoft.com/office/mac/drawingml/2011/main" xmlns:a14="http://schemas.microsoft.com/office/drawing/2010/main" xmlns:m="http://schemas.openxmlformats.org/officeDocument/2006/math" xmlns="" val="1"/>
+              <ma14:wrappingTextBoxFlag xmlns="" xmlns:m="http://schemas.openxmlformats.org/officeDocument/2006/math" xmlns:a14="http://schemas.microsoft.com/office/drawing/2010/main" xmlns:ma14="http://schemas.microsoft.com/office/mac/drawingml/2011/main" val="1"/>
             </a:ext>
           </a:extLst>
         </p:spPr>
@@ -17858,7 +17852,7 @@
           </a:prstGeom>
           <a:extLst>
             <a:ext uri="{C572A759-6A51-4108-AA02-DFA0A04FC94B}">
-              <ma14:wrappingTextBoxFlag xmlns:ma14="http://schemas.microsoft.com/office/mac/drawingml/2011/main" xmlns:a14="http://schemas.microsoft.com/office/drawing/2010/main" xmlns:m="http://schemas.openxmlformats.org/officeDocument/2006/math" xmlns="" val="1"/>
+              <ma14:wrappingTextBoxFlag xmlns="" xmlns:m="http://schemas.openxmlformats.org/officeDocument/2006/math" xmlns:a14="http://schemas.microsoft.com/office/drawing/2010/main" xmlns:ma14="http://schemas.microsoft.com/office/mac/drawingml/2011/main" val="1"/>
             </a:ext>
           </a:extLst>
         </p:spPr>
@@ -17983,7 +17977,7 @@
           </a:ln>
           <a:extLst>
             <a:ext uri="{C572A759-6A51-4108-AA02-DFA0A04FC94B}">
-              <ma14:wrappingTextBoxFlag xmlns:ma14="http://schemas.microsoft.com/office/mac/drawingml/2011/main" xmlns:a14="http://schemas.microsoft.com/office/drawing/2010/main" xmlns:m="http://schemas.openxmlformats.org/officeDocument/2006/math" xmlns="" val="1"/>
+              <ma14:wrappingTextBoxFlag xmlns="" xmlns:m="http://schemas.openxmlformats.org/officeDocument/2006/math" xmlns:a14="http://schemas.microsoft.com/office/drawing/2010/main" xmlns:ma14="http://schemas.microsoft.com/office/mac/drawingml/2011/main" val="1"/>
             </a:ext>
           </a:extLst>
         </p:spPr>
@@ -18188,7 +18182,7 @@
           </a:ln>
           <a:extLst>
             <a:ext uri="{C572A759-6A51-4108-AA02-DFA0A04FC94B}">
-              <ma14:wrappingTextBoxFlag xmlns:ma14="http://schemas.microsoft.com/office/mac/drawingml/2011/main" xmlns:a14="http://schemas.microsoft.com/office/drawing/2010/main" xmlns:m="http://schemas.openxmlformats.org/officeDocument/2006/math" xmlns="" val="1"/>
+              <ma14:wrappingTextBoxFlag xmlns="" xmlns:m="http://schemas.openxmlformats.org/officeDocument/2006/math" xmlns:a14="http://schemas.microsoft.com/office/drawing/2010/main" xmlns:ma14="http://schemas.microsoft.com/office/mac/drawingml/2011/main" val="1"/>
             </a:ext>
           </a:extLst>
         </p:spPr>
@@ -18231,7 +18225,7 @@
           </a:ln>
           <a:extLst>
             <a:ext uri="{C572A759-6A51-4108-AA02-DFA0A04FC94B}">
-              <ma14:wrappingTextBoxFlag xmlns:ma14="http://schemas.microsoft.com/office/mac/drawingml/2011/main" xmlns:a14="http://schemas.microsoft.com/office/drawing/2010/main" xmlns:m="http://schemas.openxmlformats.org/officeDocument/2006/math" xmlns="" val="1"/>
+              <ma14:wrappingTextBoxFlag xmlns="" xmlns:m="http://schemas.openxmlformats.org/officeDocument/2006/math" xmlns:a14="http://schemas.microsoft.com/office/drawing/2010/main" xmlns:ma14="http://schemas.microsoft.com/office/mac/drawingml/2011/main" val="1"/>
             </a:ext>
           </a:extLst>
         </p:spPr>
@@ -18289,7 +18283,7 @@
           </a:ln>
           <a:extLst>
             <a:ext uri="{C572A759-6A51-4108-AA02-DFA0A04FC94B}">
-              <ma14:wrappingTextBoxFlag xmlns:ma14="http://schemas.microsoft.com/office/mac/drawingml/2011/main" xmlns:a14="http://schemas.microsoft.com/office/drawing/2010/main" xmlns:m="http://schemas.openxmlformats.org/officeDocument/2006/math" xmlns="" val="1"/>
+              <ma14:wrappingTextBoxFlag xmlns="" xmlns:m="http://schemas.openxmlformats.org/officeDocument/2006/math" xmlns:a14="http://schemas.microsoft.com/office/drawing/2010/main" xmlns:ma14="http://schemas.microsoft.com/office/mac/drawingml/2011/main" val="1"/>
             </a:ext>
           </a:extLst>
         </p:spPr>
@@ -18387,7 +18381,7 @@
           </a:prstGeom>
           <a:extLst>
             <a:ext uri="{C572A759-6A51-4108-AA02-DFA0A04FC94B}">
-              <ma14:wrappingTextBoxFlag xmlns:ma14="http://schemas.microsoft.com/office/mac/drawingml/2011/main" xmlns:a14="http://schemas.microsoft.com/office/drawing/2010/main" xmlns:m="http://schemas.openxmlformats.org/officeDocument/2006/math" xmlns="" val="1"/>
+              <ma14:wrappingTextBoxFlag xmlns="" xmlns:m="http://schemas.openxmlformats.org/officeDocument/2006/math" xmlns:a14="http://schemas.microsoft.com/office/drawing/2010/main" xmlns:ma14="http://schemas.microsoft.com/office/mac/drawingml/2011/main" val="1"/>
             </a:ext>
           </a:extLst>
         </p:spPr>
@@ -18507,7 +18501,7 @@
           </a:ln>
           <a:extLst>
             <a:ext uri="{C572A759-6A51-4108-AA02-DFA0A04FC94B}">
-              <ma14:wrappingTextBoxFlag xmlns:ma14="http://schemas.microsoft.com/office/mac/drawingml/2011/main" xmlns:a14="http://schemas.microsoft.com/office/drawing/2010/main" xmlns:m="http://schemas.openxmlformats.org/officeDocument/2006/math" xmlns="" val="1"/>
+              <ma14:wrappingTextBoxFlag xmlns="" xmlns:m="http://schemas.openxmlformats.org/officeDocument/2006/math" xmlns:a14="http://schemas.microsoft.com/office/drawing/2010/main" xmlns:ma14="http://schemas.microsoft.com/office/mac/drawingml/2011/main" val="1"/>
             </a:ext>
           </a:extLst>
         </p:spPr>
@@ -18558,7 +18552,7 @@
           </a:ln>
           <a:extLst>
             <a:ext uri="{C572A759-6A51-4108-AA02-DFA0A04FC94B}">
-              <ma14:wrappingTextBoxFlag xmlns:ma14="http://schemas.microsoft.com/office/mac/drawingml/2011/main" xmlns:a14="http://schemas.microsoft.com/office/drawing/2010/main" xmlns:m="http://schemas.openxmlformats.org/officeDocument/2006/math" xmlns="" val="1"/>
+              <ma14:wrappingTextBoxFlag xmlns="" xmlns:m="http://schemas.openxmlformats.org/officeDocument/2006/math" xmlns:a14="http://schemas.microsoft.com/office/drawing/2010/main" xmlns:ma14="http://schemas.microsoft.com/office/mac/drawingml/2011/main" val="1"/>
             </a:ext>
           </a:extLst>
         </p:spPr>
@@ -18609,7 +18603,7 @@
           </a:ln>
           <a:extLst>
             <a:ext uri="{C572A759-6A51-4108-AA02-DFA0A04FC94B}">
-              <ma14:wrappingTextBoxFlag xmlns:ma14="http://schemas.microsoft.com/office/mac/drawingml/2011/main" xmlns:a14="http://schemas.microsoft.com/office/drawing/2010/main" xmlns:m="http://schemas.openxmlformats.org/officeDocument/2006/math" xmlns="" val="1"/>
+              <ma14:wrappingTextBoxFlag xmlns="" xmlns:m="http://schemas.openxmlformats.org/officeDocument/2006/math" xmlns:a14="http://schemas.microsoft.com/office/drawing/2010/main" xmlns:ma14="http://schemas.microsoft.com/office/mac/drawingml/2011/main" val="1"/>
             </a:ext>
           </a:extLst>
         </p:spPr>
@@ -18763,7 +18757,7 @@
               <a:effectLst/>
               <a:extLst>
                 <a:ext uri="{C572A759-6A51-4108-AA02-DFA0A04FC94B}">
-                  <ma14:wrappingTextBoxFlag xmlns:ma14="http://schemas.microsoft.com/office/mac/drawingml/2011/main" xmlns:a14="http://schemas.microsoft.com/office/drawing/2010/main" xmlns:m="http://schemas.openxmlformats.org/officeDocument/2006/math" xmlns="" val="1"/>
+                  <ma14:wrappingTextBoxFlag xmlns="" xmlns:m="http://schemas.openxmlformats.org/officeDocument/2006/math" xmlns:a14="http://schemas.microsoft.com/office/drawing/2010/main" xmlns:ma14="http://schemas.microsoft.com/office/mac/drawingml/2011/main" val="1"/>
                 </a:ext>
               </a:extLst>
             </p:spPr>
@@ -18872,7 +18866,7 @@
               <a:effectLst/>
               <a:extLst>
                 <a:ext uri="{C572A759-6A51-4108-AA02-DFA0A04FC94B}">
-                  <ma14:wrappingTextBoxFlag xmlns:ma14="http://schemas.microsoft.com/office/mac/drawingml/2011/main" xmlns:a14="http://schemas.microsoft.com/office/drawing/2010/main" xmlns:m="http://schemas.openxmlformats.org/officeDocument/2006/math" xmlns="" val="1"/>
+                  <ma14:wrappingTextBoxFlag xmlns="" xmlns:m="http://schemas.openxmlformats.org/officeDocument/2006/math" xmlns:a14="http://schemas.microsoft.com/office/drawing/2010/main" xmlns:ma14="http://schemas.microsoft.com/office/mac/drawingml/2011/main" val="1"/>
                 </a:ext>
               </a:extLst>
             </p:spPr>
@@ -18981,7 +18975,7 @@
               <a:effectLst/>
               <a:extLst>
                 <a:ext uri="{C572A759-6A51-4108-AA02-DFA0A04FC94B}">
-                  <ma14:wrappingTextBoxFlag xmlns:ma14="http://schemas.microsoft.com/office/mac/drawingml/2011/main" xmlns:a14="http://schemas.microsoft.com/office/drawing/2010/main" xmlns:m="http://schemas.openxmlformats.org/officeDocument/2006/math" xmlns="" val="1"/>
+                  <ma14:wrappingTextBoxFlag xmlns="" xmlns:m="http://schemas.openxmlformats.org/officeDocument/2006/math" xmlns:a14="http://schemas.microsoft.com/office/drawing/2010/main" xmlns:ma14="http://schemas.microsoft.com/office/mac/drawingml/2011/main" val="1"/>
                 </a:ext>
               </a:extLst>
             </p:spPr>
@@ -19090,7 +19084,7 @@
               <a:effectLst/>
               <a:extLst>
                 <a:ext uri="{C572A759-6A51-4108-AA02-DFA0A04FC94B}">
-                  <ma14:wrappingTextBoxFlag xmlns:ma14="http://schemas.microsoft.com/office/mac/drawingml/2011/main" xmlns:a14="http://schemas.microsoft.com/office/drawing/2010/main" xmlns:m="http://schemas.openxmlformats.org/officeDocument/2006/math" xmlns="" val="1"/>
+                  <ma14:wrappingTextBoxFlag xmlns="" xmlns:m="http://schemas.openxmlformats.org/officeDocument/2006/math" xmlns:a14="http://schemas.microsoft.com/office/drawing/2010/main" xmlns:ma14="http://schemas.microsoft.com/office/mac/drawingml/2011/main" val="1"/>
                 </a:ext>
               </a:extLst>
             </p:spPr>
@@ -19199,7 +19193,7 @@
               <a:effectLst/>
               <a:extLst>
                 <a:ext uri="{C572A759-6A51-4108-AA02-DFA0A04FC94B}">
-                  <ma14:wrappingTextBoxFlag xmlns:ma14="http://schemas.microsoft.com/office/mac/drawingml/2011/main" xmlns:a14="http://schemas.microsoft.com/office/drawing/2010/main" xmlns:m="http://schemas.openxmlformats.org/officeDocument/2006/math" xmlns="" val="1"/>
+                  <ma14:wrappingTextBoxFlag xmlns="" xmlns:m="http://schemas.openxmlformats.org/officeDocument/2006/math" xmlns:a14="http://schemas.microsoft.com/office/drawing/2010/main" xmlns:ma14="http://schemas.microsoft.com/office/mac/drawingml/2011/main" val="1"/>
                 </a:ext>
               </a:extLst>
             </p:spPr>
@@ -19308,7 +19302,7 @@
               <a:effectLst/>
               <a:extLst>
                 <a:ext uri="{C572A759-6A51-4108-AA02-DFA0A04FC94B}">
-                  <ma14:wrappingTextBoxFlag xmlns:ma14="http://schemas.microsoft.com/office/mac/drawingml/2011/main" xmlns:a14="http://schemas.microsoft.com/office/drawing/2010/main" xmlns:m="http://schemas.openxmlformats.org/officeDocument/2006/math" xmlns="" val="1"/>
+                  <ma14:wrappingTextBoxFlag xmlns="" xmlns:m="http://schemas.openxmlformats.org/officeDocument/2006/math" xmlns:a14="http://schemas.microsoft.com/office/drawing/2010/main" xmlns:ma14="http://schemas.microsoft.com/office/mac/drawingml/2011/main" val="1"/>
                 </a:ext>
               </a:extLst>
             </p:spPr>
@@ -19501,7 +19495,7 @@
           </a:ln>
           <a:extLst>
             <a:ext uri="{C572A759-6A51-4108-AA02-DFA0A04FC94B}">
-              <ma14:wrappingTextBoxFlag xmlns:ma14="http://schemas.microsoft.com/office/mac/drawingml/2011/main" xmlns:a14="http://schemas.microsoft.com/office/drawing/2010/main" xmlns:m="http://schemas.openxmlformats.org/officeDocument/2006/math" xmlns="" val="1"/>
+              <ma14:wrappingTextBoxFlag xmlns="" xmlns:m="http://schemas.openxmlformats.org/officeDocument/2006/math" xmlns:a14="http://schemas.microsoft.com/office/drawing/2010/main" xmlns:ma14="http://schemas.microsoft.com/office/mac/drawingml/2011/main" val="1"/>
             </a:ext>
           </a:extLst>
         </p:spPr>
@@ -19556,7 +19550,7 @@
           </a:ln>
           <a:extLst>
             <a:ext uri="{C572A759-6A51-4108-AA02-DFA0A04FC94B}">
-              <ma14:wrappingTextBoxFlag xmlns:ma14="http://schemas.microsoft.com/office/mac/drawingml/2011/main" xmlns:a14="http://schemas.microsoft.com/office/drawing/2010/main" xmlns:m="http://schemas.openxmlformats.org/officeDocument/2006/math" xmlns="" val="1"/>
+              <ma14:wrappingTextBoxFlag xmlns="" xmlns:m="http://schemas.openxmlformats.org/officeDocument/2006/math" xmlns:a14="http://schemas.microsoft.com/office/drawing/2010/main" xmlns:ma14="http://schemas.microsoft.com/office/mac/drawingml/2011/main" val="1"/>
             </a:ext>
           </a:extLst>
         </p:spPr>
@@ -19607,7 +19601,7 @@
           </a:ln>
           <a:extLst>
             <a:ext uri="{C572A759-6A51-4108-AA02-DFA0A04FC94B}">
-              <ma14:wrappingTextBoxFlag xmlns:ma14="http://schemas.microsoft.com/office/mac/drawingml/2011/main" xmlns:a14="http://schemas.microsoft.com/office/drawing/2010/main" xmlns:m="http://schemas.openxmlformats.org/officeDocument/2006/math" xmlns="" val="1"/>
+              <ma14:wrappingTextBoxFlag xmlns="" xmlns:m="http://schemas.openxmlformats.org/officeDocument/2006/math" xmlns:a14="http://schemas.microsoft.com/office/drawing/2010/main" xmlns:ma14="http://schemas.microsoft.com/office/mac/drawingml/2011/main" val="1"/>
             </a:ext>
           </a:extLst>
         </p:spPr>
@@ -19658,7 +19652,7 @@
           </a:ln>
           <a:extLst>
             <a:ext uri="{C572A759-6A51-4108-AA02-DFA0A04FC94B}">
-              <ma14:wrappingTextBoxFlag xmlns:ma14="http://schemas.microsoft.com/office/mac/drawingml/2011/main" xmlns:a14="http://schemas.microsoft.com/office/drawing/2010/main" xmlns:m="http://schemas.openxmlformats.org/officeDocument/2006/math" xmlns="" val="1"/>
+              <ma14:wrappingTextBoxFlag xmlns="" xmlns:m="http://schemas.openxmlformats.org/officeDocument/2006/math" xmlns:a14="http://schemas.microsoft.com/office/drawing/2010/main" xmlns:ma14="http://schemas.microsoft.com/office/mac/drawingml/2011/main" val="1"/>
             </a:ext>
           </a:extLst>
         </p:spPr>
@@ -19743,7 +19737,7 @@
           </a:ln>
           <a:extLst>
             <a:ext uri="{C572A759-6A51-4108-AA02-DFA0A04FC94B}">
-              <ma14:wrappingTextBoxFlag xmlns:ma14="http://schemas.microsoft.com/office/mac/drawingml/2011/main" xmlns:a14="http://schemas.microsoft.com/office/drawing/2010/main" xmlns:m="http://schemas.openxmlformats.org/officeDocument/2006/math" xmlns="" val="1"/>
+              <ma14:wrappingTextBoxFlag xmlns="" xmlns:m="http://schemas.openxmlformats.org/officeDocument/2006/math" xmlns:a14="http://schemas.microsoft.com/office/drawing/2010/main" xmlns:ma14="http://schemas.microsoft.com/office/mac/drawingml/2011/main" val="1"/>
             </a:ext>
           </a:extLst>
         </p:spPr>
@@ -19820,7 +19814,7 @@
           </a:ln>
           <a:extLst>
             <a:ext uri="{C572A759-6A51-4108-AA02-DFA0A04FC94B}">
-              <ma14:wrappingTextBoxFlag xmlns:ma14="http://schemas.microsoft.com/office/mac/drawingml/2011/main" xmlns:a14="http://schemas.microsoft.com/office/drawing/2010/main" xmlns:m="http://schemas.openxmlformats.org/officeDocument/2006/math" xmlns="" val="1"/>
+              <ma14:wrappingTextBoxFlag xmlns="" xmlns:m="http://schemas.openxmlformats.org/officeDocument/2006/math" xmlns:a14="http://schemas.microsoft.com/office/drawing/2010/main" xmlns:ma14="http://schemas.microsoft.com/office/mac/drawingml/2011/main" val="1"/>
             </a:ext>
           </a:extLst>
         </p:spPr>
@@ -19915,7 +19909,7 @@
           </a:prstGeom>
           <a:extLst>
             <a:ext uri="{C572A759-6A51-4108-AA02-DFA0A04FC94B}">
-              <ma14:wrappingTextBoxFlag xmlns:ma14="http://schemas.microsoft.com/office/mac/drawingml/2011/main" xmlns:a14="http://schemas.microsoft.com/office/drawing/2010/main" xmlns:m="http://schemas.openxmlformats.org/officeDocument/2006/math" xmlns="" val="1"/>
+              <ma14:wrappingTextBoxFlag xmlns="" xmlns:m="http://schemas.openxmlformats.org/officeDocument/2006/math" xmlns:a14="http://schemas.microsoft.com/office/drawing/2010/main" xmlns:ma14="http://schemas.microsoft.com/office/mac/drawingml/2011/main" val="1"/>
             </a:ext>
           </a:extLst>
         </p:spPr>
@@ -20046,7 +20040,7 @@
           </a:ln>
           <a:extLst>
             <a:ext uri="{C572A759-6A51-4108-AA02-DFA0A04FC94B}">
-              <ma14:wrappingTextBoxFlag xmlns:ma14="http://schemas.microsoft.com/office/mac/drawingml/2011/main" xmlns:a14="http://schemas.microsoft.com/office/drawing/2010/main" xmlns:m="http://schemas.openxmlformats.org/officeDocument/2006/math" xmlns="" val="1"/>
+              <ma14:wrappingTextBoxFlag xmlns="" xmlns:m="http://schemas.openxmlformats.org/officeDocument/2006/math" xmlns:a14="http://schemas.microsoft.com/office/drawing/2010/main" xmlns:ma14="http://schemas.microsoft.com/office/mac/drawingml/2011/main" val="1"/>
             </a:ext>
           </a:extLst>
         </p:spPr>
@@ -20215,7 +20209,7 @@
           </a:ln>
           <a:extLst>
             <a:ext uri="{C572A759-6A51-4108-AA02-DFA0A04FC94B}">
-              <ma14:wrappingTextBoxFlag xmlns:ma14="http://schemas.microsoft.com/office/mac/drawingml/2011/main" xmlns:a14="http://schemas.microsoft.com/office/drawing/2010/main" xmlns:m="http://schemas.openxmlformats.org/officeDocument/2006/math" xmlns="" val="1"/>
+              <ma14:wrappingTextBoxFlag xmlns="" xmlns:m="http://schemas.openxmlformats.org/officeDocument/2006/math" xmlns:a14="http://schemas.microsoft.com/office/drawing/2010/main" xmlns:ma14="http://schemas.microsoft.com/office/mac/drawingml/2011/main" val="1"/>
             </a:ext>
           </a:extLst>
         </p:spPr>
@@ -20258,7 +20252,7 @@
           </a:ln>
           <a:extLst>
             <a:ext uri="{C572A759-6A51-4108-AA02-DFA0A04FC94B}">
-              <ma14:wrappingTextBoxFlag xmlns:ma14="http://schemas.microsoft.com/office/mac/drawingml/2011/main" xmlns:a14="http://schemas.microsoft.com/office/drawing/2010/main" xmlns:m="http://schemas.openxmlformats.org/officeDocument/2006/math" xmlns="" val="1"/>
+              <ma14:wrappingTextBoxFlag xmlns="" xmlns:m="http://schemas.openxmlformats.org/officeDocument/2006/math" xmlns:a14="http://schemas.microsoft.com/office/drawing/2010/main" xmlns:ma14="http://schemas.microsoft.com/office/mac/drawingml/2011/main" val="1"/>
             </a:ext>
           </a:extLst>
         </p:spPr>
@@ -20432,7 +20426,7 @@
           </a:ln>
           <a:extLst>
             <a:ext uri="{C572A759-6A51-4108-AA02-DFA0A04FC94B}">
-              <ma14:wrappingTextBoxFlag xmlns:ma14="http://schemas.microsoft.com/office/mac/drawingml/2011/main" xmlns:a14="http://schemas.microsoft.com/office/drawing/2010/main" xmlns:m="http://schemas.openxmlformats.org/officeDocument/2006/math" xmlns="" val="1"/>
+              <ma14:wrappingTextBoxFlag xmlns="" xmlns:m="http://schemas.openxmlformats.org/officeDocument/2006/math" xmlns:a14="http://schemas.microsoft.com/office/drawing/2010/main" xmlns:ma14="http://schemas.microsoft.com/office/mac/drawingml/2011/main" val="1"/>
             </a:ext>
           </a:extLst>
         </p:spPr>
@@ -20508,7 +20502,7 @@
           </a:ln>
           <a:extLst>
             <a:ext uri="{C572A759-6A51-4108-AA02-DFA0A04FC94B}">
-              <ma14:wrappingTextBoxFlag xmlns:ma14="http://schemas.microsoft.com/office/mac/drawingml/2011/main" xmlns:a14="http://schemas.microsoft.com/office/drawing/2010/main" xmlns:m="http://schemas.openxmlformats.org/officeDocument/2006/math" xmlns="" val="1"/>
+              <ma14:wrappingTextBoxFlag xmlns="" xmlns:m="http://schemas.openxmlformats.org/officeDocument/2006/math" xmlns:a14="http://schemas.microsoft.com/office/drawing/2010/main" xmlns:ma14="http://schemas.microsoft.com/office/mac/drawingml/2011/main" val="1"/>
             </a:ext>
           </a:extLst>
         </p:spPr>
@@ -20543,7 +20537,7 @@
           </a:ln>
           <a:extLst>
             <a:ext uri="{C572A759-6A51-4108-AA02-DFA0A04FC94B}">
-              <ma14:wrappingTextBoxFlag xmlns:ma14="http://schemas.microsoft.com/office/mac/drawingml/2011/main" xmlns:a14="http://schemas.microsoft.com/office/drawing/2010/main" xmlns:m="http://schemas.openxmlformats.org/officeDocument/2006/math" xmlns="" val="1"/>
+              <ma14:wrappingTextBoxFlag xmlns="" xmlns:m="http://schemas.openxmlformats.org/officeDocument/2006/math" xmlns:a14="http://schemas.microsoft.com/office/drawing/2010/main" xmlns:ma14="http://schemas.microsoft.com/office/mac/drawingml/2011/main" val="1"/>
             </a:ext>
           </a:extLst>
         </p:spPr>

</xml_diff>